<commit_message>
Added per run measurement_args
</commit_message>
<xml_diff>
--- a/Slides/Figures.pptx
+++ b/Slides/Figures.pptx
@@ -104,6 +104,11 @@
       </a:defRPr>
     </a:lvl9pPr>
   </p:defaultTextStyle>
+  <p:extLst>
+    <p:ext uri="{EFAFB233-063F-42B5-8137-9DF3F51BA10A}">
+      <p15:sldGuideLst xmlns:p15="http://schemas.microsoft.com/office/powerpoint/2012/main"/>
+    </p:ext>
+  </p:extLst>
 </p:presentation>
 </file>
 
@@ -238,7 +243,7 @@
           <a:p>
             <a:fld id="{F4EA1E63-6688-984B-99CA-2362B7452F59}" type="datetimeFigureOut">
               <a:rPr kumimoji="1" lang="ja-US" altLang="en-US" smtClean="0"/>
-              <a:t>4/7/25</a:t>
+              <a:t>4/27/25</a:t>
             </a:fld>
             <a:endParaRPr kumimoji="1" lang="ja-US" altLang="en-US"/>
           </a:p>
@@ -440,7 +445,7 @@
           <a:p>
             <a:fld id="{F4EA1E63-6688-984B-99CA-2362B7452F59}" type="datetimeFigureOut">
               <a:rPr kumimoji="1" lang="ja-US" altLang="en-US" smtClean="0"/>
-              <a:t>4/7/25</a:t>
+              <a:t>4/27/25</a:t>
             </a:fld>
             <a:endParaRPr kumimoji="1" lang="ja-US" altLang="en-US"/>
           </a:p>
@@ -652,7 +657,7 @@
           <a:p>
             <a:fld id="{F4EA1E63-6688-984B-99CA-2362B7452F59}" type="datetimeFigureOut">
               <a:rPr kumimoji="1" lang="ja-US" altLang="en-US" smtClean="0"/>
-              <a:t>4/7/25</a:t>
+              <a:t>4/27/25</a:t>
             </a:fld>
             <a:endParaRPr kumimoji="1" lang="ja-US" altLang="en-US"/>
           </a:p>
@@ -854,7 +859,7 @@
           <a:p>
             <a:fld id="{F4EA1E63-6688-984B-99CA-2362B7452F59}" type="datetimeFigureOut">
               <a:rPr kumimoji="1" lang="ja-US" altLang="en-US" smtClean="0"/>
-              <a:t>4/7/25</a:t>
+              <a:t>4/27/25</a:t>
             </a:fld>
             <a:endParaRPr kumimoji="1" lang="ja-US" altLang="en-US"/>
           </a:p>
@@ -1100,7 +1105,7 @@
           <a:p>
             <a:fld id="{F4EA1E63-6688-984B-99CA-2362B7452F59}" type="datetimeFigureOut">
               <a:rPr kumimoji="1" lang="ja-US" altLang="en-US" smtClean="0"/>
-              <a:t>4/7/25</a:t>
+              <a:t>4/27/25</a:t>
             </a:fld>
             <a:endParaRPr kumimoji="1" lang="ja-US" altLang="en-US"/>
           </a:p>
@@ -1396,7 +1401,7 @@
           <a:p>
             <a:fld id="{F4EA1E63-6688-984B-99CA-2362B7452F59}" type="datetimeFigureOut">
               <a:rPr kumimoji="1" lang="ja-US" altLang="en-US" smtClean="0"/>
-              <a:t>4/7/25</a:t>
+              <a:t>4/27/25</a:t>
             </a:fld>
             <a:endParaRPr kumimoji="1" lang="ja-US" altLang="en-US"/>
           </a:p>
@@ -1827,7 +1832,7 @@
           <a:p>
             <a:fld id="{F4EA1E63-6688-984B-99CA-2362B7452F59}" type="datetimeFigureOut">
               <a:rPr kumimoji="1" lang="ja-US" altLang="en-US" smtClean="0"/>
-              <a:t>4/7/25</a:t>
+              <a:t>4/27/25</a:t>
             </a:fld>
             <a:endParaRPr kumimoji="1" lang="ja-US" altLang="en-US"/>
           </a:p>
@@ -1945,7 +1950,7 @@
           <a:p>
             <a:fld id="{F4EA1E63-6688-984B-99CA-2362B7452F59}" type="datetimeFigureOut">
               <a:rPr kumimoji="1" lang="ja-US" altLang="en-US" smtClean="0"/>
-              <a:t>4/7/25</a:t>
+              <a:t>4/27/25</a:t>
             </a:fld>
             <a:endParaRPr kumimoji="1" lang="ja-US" altLang="en-US"/>
           </a:p>
@@ -2040,7 +2045,7 @@
           <a:p>
             <a:fld id="{F4EA1E63-6688-984B-99CA-2362B7452F59}" type="datetimeFigureOut">
               <a:rPr kumimoji="1" lang="ja-US" altLang="en-US" smtClean="0"/>
-              <a:t>4/7/25</a:t>
+              <a:t>4/27/25</a:t>
             </a:fld>
             <a:endParaRPr kumimoji="1" lang="ja-US" altLang="en-US"/>
           </a:p>
@@ -2349,7 +2354,7 @@
           <a:p>
             <a:fld id="{F4EA1E63-6688-984B-99CA-2362B7452F59}" type="datetimeFigureOut">
               <a:rPr kumimoji="1" lang="ja-US" altLang="en-US" smtClean="0"/>
-              <a:t>4/7/25</a:t>
+              <a:t>4/27/25</a:t>
             </a:fld>
             <a:endParaRPr kumimoji="1" lang="ja-US" altLang="en-US"/>
           </a:p>
@@ -2606,7 +2611,7 @@
           <a:p>
             <a:fld id="{F4EA1E63-6688-984B-99CA-2362B7452F59}" type="datetimeFigureOut">
               <a:rPr kumimoji="1" lang="ja-US" altLang="en-US" smtClean="0"/>
-              <a:t>4/7/25</a:t>
+              <a:t>4/27/25</a:t>
             </a:fld>
             <a:endParaRPr kumimoji="1" lang="ja-US" altLang="en-US"/>
           </a:p>
@@ -2851,7 +2856,7 @@
           <a:p>
             <a:fld id="{F4EA1E63-6688-984B-99CA-2362B7452F59}" type="datetimeFigureOut">
               <a:rPr kumimoji="1" lang="ja-US" altLang="en-US" smtClean="0"/>
-              <a:t>4/7/25</a:t>
+              <a:t>4/27/25</a:t>
             </a:fld>
             <a:endParaRPr kumimoji="1" lang="ja-US" altLang="en-US"/>
           </a:p>
@@ -3465,8 +3470,8 @@
             <a:chExt cx="1517698" cy="1624253"/>
           </a:xfrm>
         </p:grpSpPr>
-        <mc:AlternateContent xmlns:mc="http://schemas.openxmlformats.org/markup-compatibility/2006">
-          <mc:Choice xmlns:a14="http://schemas.microsoft.com/office/drawing/2010/main" Requires="a14">
+        <mc:AlternateContent xmlns:mc="http://schemas.openxmlformats.org/markup-compatibility/2006" xmlns:a14="http://schemas.microsoft.com/office/drawing/2010/main">
+          <mc:Choice Requires="a14">
             <p:sp>
               <p:nvSpPr>
                 <p:cNvPr id="23" name="テキスト ボックス 22">
@@ -3495,6 +3500,7 @@
                 </a:bodyPr>
                 <a:lstStyle/>
                 <a:p>
+                  <a:pPr/>
                   <a14:m>
                     <m:oMathPara xmlns:m="http://schemas.openxmlformats.org/officeDocument/2006/math">
                       <m:oMathParaPr>
@@ -3532,7 +3538,7 @@
               </p:txBody>
             </p:sp>
           </mc:Choice>
-          <mc:Fallback>
+          <mc:Fallback xmlns="">
             <p:sp>
               <p:nvSpPr>
                 <p:cNvPr id="23" name="テキスト ボックス 22">
@@ -3882,8 +3888,8 @@
               </a:fontRef>
             </p:style>
           </p:cxnSp>
-          <mc:AlternateContent xmlns:mc="http://schemas.openxmlformats.org/markup-compatibility/2006">
-            <mc:Choice xmlns:a14="http://schemas.microsoft.com/office/drawing/2010/main" Requires="a14">
+          <mc:AlternateContent xmlns:mc="http://schemas.openxmlformats.org/markup-compatibility/2006" xmlns:a14="http://schemas.microsoft.com/office/drawing/2010/main">
+            <mc:Choice Requires="a14">
               <p:sp>
                 <p:nvSpPr>
                   <p:cNvPr id="24" name="テキスト ボックス 23">
@@ -3912,6 +3918,7 @@
                   </a:bodyPr>
                   <a:lstStyle/>
                   <a:p>
+                    <a:pPr/>
                     <a14:m>
                       <m:oMathPara xmlns:m="http://schemas.openxmlformats.org/officeDocument/2006/math">
                         <m:oMathParaPr>
@@ -3949,7 +3956,7 @@
                 </p:txBody>
               </p:sp>
             </mc:Choice>
-            <mc:Fallback>
+            <mc:Fallback xmlns="">
               <p:sp>
                 <p:nvSpPr>
                   <p:cNvPr id="24" name="テキスト ボックス 23">
@@ -3994,8 +4001,8 @@
               </p:sp>
             </mc:Fallback>
           </mc:AlternateContent>
-          <mc:AlternateContent xmlns:mc="http://schemas.openxmlformats.org/markup-compatibility/2006">
-            <mc:Choice xmlns:a14="http://schemas.microsoft.com/office/drawing/2010/main" Requires="a14">
+          <mc:AlternateContent xmlns:mc="http://schemas.openxmlformats.org/markup-compatibility/2006" xmlns:a14="http://schemas.microsoft.com/office/drawing/2010/main">
+            <mc:Choice Requires="a14">
               <p:sp>
                 <p:nvSpPr>
                   <p:cNvPr id="25" name="テキスト ボックス 24">
@@ -4024,6 +4031,7 @@
                   </a:bodyPr>
                   <a:lstStyle/>
                   <a:p>
+                    <a:pPr/>
                     <a14:m>
                       <m:oMathPara xmlns:m="http://schemas.openxmlformats.org/officeDocument/2006/math">
                         <m:oMathParaPr>
@@ -4061,7 +4069,7 @@
                 </p:txBody>
               </p:sp>
             </mc:Choice>
-            <mc:Fallback>
+            <mc:Fallback xmlns="">
               <p:sp>
                 <p:nvSpPr>
                   <p:cNvPr id="25" name="テキスト ボックス 24">
@@ -4287,6 +4295,98 @@
                 <a:cs typeface="Times New Roman" panose="02020603050405020304" pitchFamily="18" charset="0"/>
               </a:rPr>
               <a:t>r</a:t>
+            </a:r>
+            <a:endParaRPr kumimoji="1" lang="ja-US" altLang="en-US" sz="1400" b="1" i="1" dirty="0">
+              <a:latin typeface="Times New Roman" panose="02020603050405020304" pitchFamily="18" charset="0"/>
+              <a:cs typeface="Times New Roman" panose="02020603050405020304" pitchFamily="18" charset="0"/>
+            </a:endParaRPr>
+          </a:p>
+        </p:txBody>
+      </p:sp>
+      <p:cxnSp>
+        <p:nvCxnSpPr>
+          <p:cNvPr id="2" name="直線矢印コネクタ 1">
+            <a:extLst>
+              <a:ext uri="{FF2B5EF4-FFF2-40B4-BE49-F238E27FC236}">
+                <a16:creationId xmlns:a16="http://schemas.microsoft.com/office/drawing/2014/main" id="{4AA1C835-5476-E663-4FF7-C88C4AA20088}"/>
+              </a:ext>
+            </a:extLst>
+          </p:cNvPr>
+          <p:cNvCxnSpPr>
+            <a:cxnSpLocks/>
+            <a:stCxn id="6" idx="1"/>
+            <a:endCxn id="29" idx="5"/>
+          </p:cNvCxnSpPr>
+          <p:nvPr/>
+        </p:nvCxnSpPr>
+        <p:spPr>
+          <a:xfrm flipH="1" flipV="1">
+            <a:off x="4560672" y="592597"/>
+            <a:ext cx="1278430" cy="1202249"/>
+          </a:xfrm>
+          <a:prstGeom prst="straightConnector1">
+            <a:avLst/>
+          </a:prstGeom>
+          <a:ln>
+            <a:tailEnd type="triangle"/>
+          </a:ln>
+        </p:spPr>
+        <p:style>
+          <a:lnRef idx="2">
+            <a:schemeClr val="dk1"/>
+          </a:lnRef>
+          <a:fillRef idx="0">
+            <a:schemeClr val="dk1"/>
+          </a:fillRef>
+          <a:effectRef idx="1">
+            <a:schemeClr val="dk1"/>
+          </a:effectRef>
+          <a:fontRef idx="minor">
+            <a:schemeClr val="tx1"/>
+          </a:fontRef>
+        </p:style>
+      </p:cxnSp>
+      <p:sp>
+        <p:nvSpPr>
+          <p:cNvPr id="7" name="テキスト ボックス 6">
+            <a:extLst>
+              <a:ext uri="{FF2B5EF4-FFF2-40B4-BE49-F238E27FC236}">
+                <a16:creationId xmlns:a16="http://schemas.microsoft.com/office/drawing/2014/main" id="{5C852BFD-7EFD-1399-0293-230235776F7B}"/>
+              </a:ext>
+            </a:extLst>
+          </p:cNvPr>
+          <p:cNvSpPr txBox="1"/>
+          <p:nvPr/>
+        </p:nvSpPr>
+        <p:spPr>
+          <a:xfrm flipH="1">
+            <a:off x="5034700" y="1154604"/>
+            <a:ext cx="455416" cy="215444"/>
+          </a:xfrm>
+          <a:prstGeom prst="rect">
+            <a:avLst/>
+          </a:prstGeom>
+          <a:noFill/>
+        </p:spPr>
+        <p:txBody>
+          <a:bodyPr wrap="square" lIns="0" tIns="0" rIns="0" bIns="0" rtlCol="0">
+            <a:spAutoFit/>
+          </a:bodyPr>
+          <a:lstStyle/>
+          <a:p>
+            <a:r>
+              <a:rPr kumimoji="1" lang="en-US" altLang="ja-US" sz="1400" b="1" i="1" dirty="0">
+                <a:latin typeface="Times New Roman" panose="02020603050405020304" pitchFamily="18" charset="0"/>
+                <a:cs typeface="Times New Roman" panose="02020603050405020304" pitchFamily="18" charset="0"/>
+              </a:rPr>
+              <a:t>r</a:t>
+            </a:r>
+            <a:r>
+              <a:rPr kumimoji="1" lang="en-US" altLang="ja-US" sz="1400" b="1" i="1" baseline="-25000" dirty="0">
+                <a:latin typeface="Times New Roman" panose="02020603050405020304" pitchFamily="18" charset="0"/>
+                <a:cs typeface="Times New Roman" panose="02020603050405020304" pitchFamily="18" charset="0"/>
+              </a:rPr>
+              <a:t>2</a:t>
             </a:r>
             <a:endParaRPr kumimoji="1" lang="ja-US" altLang="en-US" sz="1400" b="1" i="1" dirty="0">
               <a:latin typeface="Times New Roman" panose="02020603050405020304" pitchFamily="18" charset="0"/>

</xml_diff>